<commit_message>
updated background and description
</commit_message>
<xml_diff>
--- a/docs/modeling_workflow.pptx
+++ b/docs/modeling_workflow.pptx
@@ -141,7 +141,7 @@
         </p:nvSpPr>
         <p:spPr>
           <a:xfrm>
-            <a:off x="685800" y="1122363"/>
+            <a:off x="685800" y="1122364"/>
             <a:ext cx="7772400" cy="2387600"/>
           </a:xfrm>
         </p:spPr>
@@ -173,7 +173,7 @@
         </p:nvSpPr>
         <p:spPr>
           <a:xfrm>
-            <a:off x="1143000" y="3602038"/>
+            <a:off x="1143000" y="3602039"/>
             <a:ext cx="6858000" cy="1655762"/>
           </a:xfrm>
         </p:spPr>
@@ -184,35 +184,35 @@
               <a:buNone/>
               <a:defRPr sz="2400"/>
             </a:lvl1pPr>
-            <a:lvl2pPr marL="457200" indent="0" algn="ctr">
+            <a:lvl2pPr marL="457182" indent="0" algn="ctr">
               <a:buNone/>
               <a:defRPr sz="2000"/>
             </a:lvl2pPr>
-            <a:lvl3pPr marL="914400" indent="0" algn="ctr">
+            <a:lvl3pPr marL="914363" indent="0" algn="ctr">
               <a:buNone/>
               <a:defRPr sz="1800"/>
             </a:lvl3pPr>
-            <a:lvl4pPr marL="1371600" indent="0" algn="ctr">
+            <a:lvl4pPr marL="1371545" indent="0" algn="ctr">
               <a:buNone/>
               <a:defRPr sz="1600"/>
             </a:lvl4pPr>
-            <a:lvl5pPr marL="1828800" indent="0" algn="ctr">
+            <a:lvl5pPr marL="1828727" indent="0" algn="ctr">
               <a:buNone/>
               <a:defRPr sz="1600"/>
             </a:lvl5pPr>
-            <a:lvl6pPr marL="2286000" indent="0" algn="ctr">
+            <a:lvl6pPr marL="2285909" indent="0" algn="ctr">
               <a:buNone/>
               <a:defRPr sz="1600"/>
             </a:lvl6pPr>
-            <a:lvl7pPr marL="2743200" indent="0" algn="ctr">
+            <a:lvl7pPr marL="2743090" indent="0" algn="ctr">
               <a:buNone/>
               <a:defRPr sz="1600"/>
             </a:lvl7pPr>
-            <a:lvl8pPr marL="3200400" indent="0" algn="ctr">
+            <a:lvl8pPr marL="3200272" indent="0" algn="ctr">
               <a:buNone/>
               <a:defRPr sz="1600"/>
             </a:lvl8pPr>
-            <a:lvl9pPr marL="3657600" indent="0" algn="ctr">
+            <a:lvl9pPr marL="3657454" indent="0" algn="ctr">
               <a:buNone/>
               <a:defRPr sz="1600"/>
             </a:lvl9pPr>
@@ -243,7 +243,7 @@
           <a:p>
             <a:fld id="{4E348793-E847-104E-A4BF-895FFE80E6AE}" type="datetimeFigureOut">
               <a:rPr lang="en-US" smtClean="0"/>
-              <a:t>1/7/25</a:t>
+              <a:t>1/18/25</a:t>
             </a:fld>
             <a:endParaRPr lang="en-US"/>
           </a:p>
@@ -413,7 +413,7 @@
           <a:p>
             <a:fld id="{4E348793-E847-104E-A4BF-895FFE80E6AE}" type="datetimeFigureOut">
               <a:rPr lang="en-US" smtClean="0"/>
-              <a:t>1/7/25</a:t>
+              <a:t>1/18/25</a:t>
             </a:fld>
             <a:endParaRPr lang="en-US"/>
           </a:p>
@@ -503,8 +503,8 @@
         </p:nvSpPr>
         <p:spPr>
           <a:xfrm>
-            <a:off x="6543675" y="365125"/>
-            <a:ext cx="1971675" cy="5811838"/>
+            <a:off x="6543676" y="365126"/>
+            <a:ext cx="1971675" cy="5811839"/>
           </a:xfrm>
         </p:spPr>
         <p:txBody>
@@ -531,8 +531,8 @@
         </p:nvSpPr>
         <p:spPr>
           <a:xfrm>
-            <a:off x="628650" y="365125"/>
-            <a:ext cx="5800725" cy="5811838"/>
+            <a:off x="628651" y="365126"/>
+            <a:ext cx="5800725" cy="5811839"/>
           </a:xfrm>
         </p:spPr>
         <p:txBody>
@@ -593,7 +593,7 @@
           <a:p>
             <a:fld id="{4E348793-E847-104E-A4BF-895FFE80E6AE}" type="datetimeFigureOut">
               <a:rPr lang="en-US" smtClean="0"/>
-              <a:t>1/7/25</a:t>
+              <a:t>1/18/25</a:t>
             </a:fld>
             <a:endParaRPr lang="en-US"/>
           </a:p>
@@ -763,7 +763,7 @@
           <a:p>
             <a:fld id="{4E348793-E847-104E-A4BF-895FFE80E6AE}" type="datetimeFigureOut">
               <a:rPr lang="en-US" smtClean="0"/>
-              <a:t>1/7/25</a:t>
+              <a:t>1/18/25</a:t>
             </a:fld>
             <a:endParaRPr lang="en-US"/>
           </a:p>
@@ -853,8 +853,8 @@
         </p:nvSpPr>
         <p:spPr>
           <a:xfrm>
-            <a:off x="623888" y="1709739"/>
-            <a:ext cx="7886700" cy="2852737"/>
+            <a:off x="623888" y="1709740"/>
+            <a:ext cx="7886700" cy="2852738"/>
           </a:xfrm>
         </p:spPr>
         <p:txBody>
@@ -885,8 +885,8 @@
         </p:nvSpPr>
         <p:spPr>
           <a:xfrm>
-            <a:off x="623888" y="4589464"/>
-            <a:ext cx="7886700" cy="1500187"/>
+            <a:off x="623888" y="4589465"/>
+            <a:ext cx="7886700" cy="1500188"/>
           </a:xfrm>
         </p:spPr>
         <p:txBody>
@@ -900,7 +900,7 @@
                 </a:solidFill>
               </a:defRPr>
             </a:lvl1pPr>
-            <a:lvl2pPr marL="457200" indent="0">
+            <a:lvl2pPr marL="457182" indent="0">
               <a:buNone/>
               <a:defRPr sz="2000">
                 <a:solidFill>
@@ -910,7 +910,7 @@
                 </a:solidFill>
               </a:defRPr>
             </a:lvl2pPr>
-            <a:lvl3pPr marL="914400" indent="0">
+            <a:lvl3pPr marL="914363" indent="0">
               <a:buNone/>
               <a:defRPr sz="1800">
                 <a:solidFill>
@@ -920,7 +920,7 @@
                 </a:solidFill>
               </a:defRPr>
             </a:lvl3pPr>
-            <a:lvl4pPr marL="1371600" indent="0">
+            <a:lvl4pPr marL="1371545" indent="0">
               <a:buNone/>
               <a:defRPr sz="1600">
                 <a:solidFill>
@@ -930,7 +930,7 @@
                 </a:solidFill>
               </a:defRPr>
             </a:lvl4pPr>
-            <a:lvl5pPr marL="1828800" indent="0">
+            <a:lvl5pPr marL="1828727" indent="0">
               <a:buNone/>
               <a:defRPr sz="1600">
                 <a:solidFill>
@@ -940,7 +940,7 @@
                 </a:solidFill>
               </a:defRPr>
             </a:lvl5pPr>
-            <a:lvl6pPr marL="2286000" indent="0">
+            <a:lvl6pPr marL="2285909" indent="0">
               <a:buNone/>
               <a:defRPr sz="1600">
                 <a:solidFill>
@@ -950,7 +950,7 @@
                 </a:solidFill>
               </a:defRPr>
             </a:lvl6pPr>
-            <a:lvl7pPr marL="2743200" indent="0">
+            <a:lvl7pPr marL="2743090" indent="0">
               <a:buNone/>
               <a:defRPr sz="1600">
                 <a:solidFill>
@@ -960,7 +960,7 @@
                 </a:solidFill>
               </a:defRPr>
             </a:lvl7pPr>
-            <a:lvl8pPr marL="3200400" indent="0">
+            <a:lvl8pPr marL="3200272" indent="0">
               <a:buNone/>
               <a:defRPr sz="1600">
                 <a:solidFill>
@@ -970,7 +970,7 @@
                 </a:solidFill>
               </a:defRPr>
             </a:lvl8pPr>
-            <a:lvl9pPr marL="3657600" indent="0">
+            <a:lvl9pPr marL="3657454" indent="0">
               <a:buNone/>
               <a:defRPr sz="1600">
                 <a:solidFill>
@@ -1007,7 +1007,7 @@
           <a:p>
             <a:fld id="{4E348793-E847-104E-A4BF-895FFE80E6AE}" type="datetimeFigureOut">
               <a:rPr lang="en-US" smtClean="0"/>
-              <a:t>1/7/25</a:t>
+              <a:t>1/18/25</a:t>
             </a:fld>
             <a:endParaRPr lang="en-US"/>
           </a:p>
@@ -1120,7 +1120,7 @@
         </p:nvSpPr>
         <p:spPr>
           <a:xfrm>
-            <a:off x="628650" y="1825625"/>
+            <a:off x="628650" y="1825624"/>
             <a:ext cx="3886200" cy="4351338"/>
           </a:xfrm>
         </p:spPr>
@@ -1177,7 +1177,7 @@
         </p:nvSpPr>
         <p:spPr>
           <a:xfrm>
-            <a:off x="4629150" y="1825625"/>
+            <a:off x="4629150" y="1825624"/>
             <a:ext cx="3886200" cy="4351338"/>
           </a:xfrm>
         </p:spPr>
@@ -1239,7 +1239,7 @@
           <a:p>
             <a:fld id="{4E348793-E847-104E-A4BF-895FFE80E6AE}" type="datetimeFigureOut">
               <a:rPr lang="en-US" smtClean="0"/>
-              <a:t>1/7/25</a:t>
+              <a:t>1/18/25</a:t>
             </a:fld>
             <a:endParaRPr lang="en-US"/>
           </a:p>
@@ -1329,8 +1329,8 @@
         </p:nvSpPr>
         <p:spPr>
           <a:xfrm>
-            <a:off x="629841" y="365126"/>
-            <a:ext cx="7886700" cy="1325563"/>
+            <a:off x="629841" y="365128"/>
+            <a:ext cx="7886700" cy="1325564"/>
           </a:xfrm>
         </p:spPr>
         <p:txBody>
@@ -1358,7 +1358,7 @@
         <p:spPr>
           <a:xfrm>
             <a:off x="629842" y="1681163"/>
-            <a:ext cx="3868340" cy="823912"/>
+            <a:ext cx="3868340" cy="823913"/>
           </a:xfrm>
         </p:spPr>
         <p:txBody>
@@ -1368,35 +1368,35 @@
               <a:buNone/>
               <a:defRPr sz="2400" b="1"/>
             </a:lvl1pPr>
-            <a:lvl2pPr marL="457200" indent="0">
+            <a:lvl2pPr marL="457182" indent="0">
               <a:buNone/>
               <a:defRPr sz="2000" b="1"/>
             </a:lvl2pPr>
-            <a:lvl3pPr marL="914400" indent="0">
+            <a:lvl3pPr marL="914363" indent="0">
               <a:buNone/>
               <a:defRPr sz="1800" b="1"/>
             </a:lvl3pPr>
-            <a:lvl4pPr marL="1371600" indent="0">
+            <a:lvl4pPr marL="1371545" indent="0">
               <a:buNone/>
               <a:defRPr sz="1600" b="1"/>
             </a:lvl4pPr>
-            <a:lvl5pPr marL="1828800" indent="0">
+            <a:lvl5pPr marL="1828727" indent="0">
               <a:buNone/>
               <a:defRPr sz="1600" b="1"/>
             </a:lvl5pPr>
-            <a:lvl6pPr marL="2286000" indent="0">
+            <a:lvl6pPr marL="2285909" indent="0">
               <a:buNone/>
               <a:defRPr sz="1600" b="1"/>
             </a:lvl6pPr>
-            <a:lvl7pPr marL="2743200" indent="0">
+            <a:lvl7pPr marL="2743090" indent="0">
               <a:buNone/>
               <a:defRPr sz="1600" b="1"/>
             </a:lvl7pPr>
-            <a:lvl8pPr marL="3200400" indent="0">
+            <a:lvl8pPr marL="3200272" indent="0">
               <a:buNone/>
               <a:defRPr sz="1600" b="1"/>
             </a:lvl8pPr>
-            <a:lvl9pPr marL="3657600" indent="0">
+            <a:lvl9pPr marL="3657454" indent="0">
               <a:buNone/>
               <a:defRPr sz="1600" b="1"/>
             </a:lvl9pPr>
@@ -1479,8 +1479,8 @@
         </p:nvSpPr>
         <p:spPr>
           <a:xfrm>
-            <a:off x="4629150" y="1681163"/>
-            <a:ext cx="3887391" cy="823912"/>
+            <a:off x="4629151" y="1681163"/>
+            <a:ext cx="3887391" cy="823913"/>
           </a:xfrm>
         </p:spPr>
         <p:txBody>
@@ -1490,35 +1490,35 @@
               <a:buNone/>
               <a:defRPr sz="2400" b="1"/>
             </a:lvl1pPr>
-            <a:lvl2pPr marL="457200" indent="0">
+            <a:lvl2pPr marL="457182" indent="0">
               <a:buNone/>
               <a:defRPr sz="2000" b="1"/>
             </a:lvl2pPr>
-            <a:lvl3pPr marL="914400" indent="0">
+            <a:lvl3pPr marL="914363" indent="0">
               <a:buNone/>
               <a:defRPr sz="1800" b="1"/>
             </a:lvl3pPr>
-            <a:lvl4pPr marL="1371600" indent="0">
+            <a:lvl4pPr marL="1371545" indent="0">
               <a:buNone/>
               <a:defRPr sz="1600" b="1"/>
             </a:lvl4pPr>
-            <a:lvl5pPr marL="1828800" indent="0">
+            <a:lvl5pPr marL="1828727" indent="0">
               <a:buNone/>
               <a:defRPr sz="1600" b="1"/>
             </a:lvl5pPr>
-            <a:lvl6pPr marL="2286000" indent="0">
+            <a:lvl6pPr marL="2285909" indent="0">
               <a:buNone/>
               <a:defRPr sz="1600" b="1"/>
             </a:lvl6pPr>
-            <a:lvl7pPr marL="2743200" indent="0">
+            <a:lvl7pPr marL="2743090" indent="0">
               <a:buNone/>
               <a:defRPr sz="1600" b="1"/>
             </a:lvl7pPr>
-            <a:lvl8pPr marL="3200400" indent="0">
+            <a:lvl8pPr marL="3200272" indent="0">
               <a:buNone/>
               <a:defRPr sz="1600" b="1"/>
             </a:lvl8pPr>
-            <a:lvl9pPr marL="3657600" indent="0">
+            <a:lvl9pPr marL="3657454" indent="0">
               <a:buNone/>
               <a:defRPr sz="1600" b="1"/>
             </a:lvl9pPr>
@@ -1544,7 +1544,7 @@
         </p:nvSpPr>
         <p:spPr>
           <a:xfrm>
-            <a:off x="4629150" y="2505075"/>
+            <a:off x="4629151" y="2505075"/>
             <a:ext cx="3887391" cy="3684588"/>
           </a:xfrm>
         </p:spPr>
@@ -1606,7 +1606,7 @@
           <a:p>
             <a:fld id="{4E348793-E847-104E-A4BF-895FFE80E6AE}" type="datetimeFigureOut">
               <a:rPr lang="en-US" smtClean="0"/>
-              <a:t>1/7/25</a:t>
+              <a:t>1/18/25</a:t>
             </a:fld>
             <a:endParaRPr lang="en-US"/>
           </a:p>
@@ -1724,7 +1724,7 @@
           <a:p>
             <a:fld id="{4E348793-E847-104E-A4BF-895FFE80E6AE}" type="datetimeFigureOut">
               <a:rPr lang="en-US" smtClean="0"/>
-              <a:t>1/7/25</a:t>
+              <a:t>1/18/25</a:t>
             </a:fld>
             <a:endParaRPr lang="en-US"/>
           </a:p>
@@ -1819,7 +1819,7 @@
           <a:p>
             <a:fld id="{4E348793-E847-104E-A4BF-895FFE80E6AE}" type="datetimeFigureOut">
               <a:rPr lang="en-US" smtClean="0"/>
-              <a:t>1/7/25</a:t>
+              <a:t>1/18/25</a:t>
             </a:fld>
             <a:endParaRPr lang="en-US"/>
           </a:p>
@@ -1909,7 +1909,7 @@
         </p:nvSpPr>
         <p:spPr>
           <a:xfrm>
-            <a:off x="629841" y="457200"/>
+            <a:off x="629842" y="457200"/>
             <a:ext cx="2949178" cy="1600200"/>
           </a:xfrm>
         </p:spPr>
@@ -1941,7 +1941,7 @@
         </p:nvSpPr>
         <p:spPr>
           <a:xfrm>
-            <a:off x="3887391" y="987426"/>
+            <a:off x="3887391" y="987428"/>
             <a:ext cx="4629150" cy="4873625"/>
           </a:xfrm>
         </p:spPr>
@@ -2026,8 +2026,8 @@
         </p:nvSpPr>
         <p:spPr>
           <a:xfrm>
-            <a:off x="629841" y="2057400"/>
-            <a:ext cx="2949178" cy="3811588"/>
+            <a:off x="629842" y="2057401"/>
+            <a:ext cx="2949178" cy="3811589"/>
           </a:xfrm>
         </p:spPr>
         <p:txBody>
@@ -2037,35 +2037,35 @@
               <a:buNone/>
               <a:defRPr sz="1600"/>
             </a:lvl1pPr>
-            <a:lvl2pPr marL="457200" indent="0">
+            <a:lvl2pPr marL="457182" indent="0">
               <a:buNone/>
               <a:defRPr sz="1400"/>
             </a:lvl2pPr>
-            <a:lvl3pPr marL="914400" indent="0">
+            <a:lvl3pPr marL="914363" indent="0">
               <a:buNone/>
               <a:defRPr sz="1200"/>
             </a:lvl3pPr>
-            <a:lvl4pPr marL="1371600" indent="0">
+            <a:lvl4pPr marL="1371545" indent="0">
               <a:buNone/>
               <a:defRPr sz="1000"/>
             </a:lvl4pPr>
-            <a:lvl5pPr marL="1828800" indent="0">
+            <a:lvl5pPr marL="1828727" indent="0">
               <a:buNone/>
               <a:defRPr sz="1000"/>
             </a:lvl5pPr>
-            <a:lvl6pPr marL="2286000" indent="0">
+            <a:lvl6pPr marL="2285909" indent="0">
               <a:buNone/>
               <a:defRPr sz="1000"/>
             </a:lvl6pPr>
-            <a:lvl7pPr marL="2743200" indent="0">
+            <a:lvl7pPr marL="2743090" indent="0">
               <a:buNone/>
               <a:defRPr sz="1000"/>
             </a:lvl7pPr>
-            <a:lvl8pPr marL="3200400" indent="0">
+            <a:lvl8pPr marL="3200272" indent="0">
               <a:buNone/>
               <a:defRPr sz="1000"/>
             </a:lvl8pPr>
-            <a:lvl9pPr marL="3657600" indent="0">
+            <a:lvl9pPr marL="3657454" indent="0">
               <a:buNone/>
               <a:defRPr sz="1000"/>
             </a:lvl9pPr>
@@ -2096,7 +2096,7 @@
           <a:p>
             <a:fld id="{4E348793-E847-104E-A4BF-895FFE80E6AE}" type="datetimeFigureOut">
               <a:rPr lang="en-US" smtClean="0"/>
-              <a:t>1/7/25</a:t>
+              <a:t>1/18/25</a:t>
             </a:fld>
             <a:endParaRPr lang="en-US"/>
           </a:p>
@@ -2186,7 +2186,7 @@
         </p:nvSpPr>
         <p:spPr>
           <a:xfrm>
-            <a:off x="629841" y="457200"/>
+            <a:off x="629842" y="457200"/>
             <a:ext cx="2949178" cy="1600200"/>
           </a:xfrm>
         </p:spPr>
@@ -2218,7 +2218,7 @@
         </p:nvSpPr>
         <p:spPr>
           <a:xfrm>
-            <a:off x="3887391" y="987426"/>
+            <a:off x="3887391" y="987428"/>
             <a:ext cx="4629150" cy="4873625"/>
           </a:xfrm>
         </p:spPr>
@@ -2229,35 +2229,35 @@
               <a:buNone/>
               <a:defRPr sz="3200"/>
             </a:lvl1pPr>
-            <a:lvl2pPr marL="457200" indent="0">
+            <a:lvl2pPr marL="457182" indent="0">
               <a:buNone/>
               <a:defRPr sz="2800"/>
             </a:lvl2pPr>
-            <a:lvl3pPr marL="914400" indent="0">
+            <a:lvl3pPr marL="914363" indent="0">
               <a:buNone/>
               <a:defRPr sz="2400"/>
             </a:lvl3pPr>
-            <a:lvl4pPr marL="1371600" indent="0">
+            <a:lvl4pPr marL="1371545" indent="0">
               <a:buNone/>
               <a:defRPr sz="2000"/>
             </a:lvl4pPr>
-            <a:lvl5pPr marL="1828800" indent="0">
+            <a:lvl5pPr marL="1828727" indent="0">
               <a:buNone/>
               <a:defRPr sz="2000"/>
             </a:lvl5pPr>
-            <a:lvl6pPr marL="2286000" indent="0">
+            <a:lvl6pPr marL="2285909" indent="0">
               <a:buNone/>
               <a:defRPr sz="2000"/>
             </a:lvl6pPr>
-            <a:lvl7pPr marL="2743200" indent="0">
+            <a:lvl7pPr marL="2743090" indent="0">
               <a:buNone/>
               <a:defRPr sz="2000"/>
             </a:lvl7pPr>
-            <a:lvl8pPr marL="3200400" indent="0">
+            <a:lvl8pPr marL="3200272" indent="0">
               <a:buNone/>
               <a:defRPr sz="2000"/>
             </a:lvl8pPr>
-            <a:lvl9pPr marL="3657600" indent="0">
+            <a:lvl9pPr marL="3657454" indent="0">
               <a:buNone/>
               <a:defRPr sz="2000"/>
             </a:lvl9pPr>
@@ -2283,8 +2283,8 @@
         </p:nvSpPr>
         <p:spPr>
           <a:xfrm>
-            <a:off x="629841" y="2057400"/>
-            <a:ext cx="2949178" cy="3811588"/>
+            <a:off x="629842" y="2057401"/>
+            <a:ext cx="2949178" cy="3811589"/>
           </a:xfrm>
         </p:spPr>
         <p:txBody>
@@ -2294,35 +2294,35 @@
               <a:buNone/>
               <a:defRPr sz="1600"/>
             </a:lvl1pPr>
-            <a:lvl2pPr marL="457200" indent="0">
+            <a:lvl2pPr marL="457182" indent="0">
               <a:buNone/>
               <a:defRPr sz="1400"/>
             </a:lvl2pPr>
-            <a:lvl3pPr marL="914400" indent="0">
+            <a:lvl3pPr marL="914363" indent="0">
               <a:buNone/>
               <a:defRPr sz="1200"/>
             </a:lvl3pPr>
-            <a:lvl4pPr marL="1371600" indent="0">
+            <a:lvl4pPr marL="1371545" indent="0">
               <a:buNone/>
               <a:defRPr sz="1000"/>
             </a:lvl4pPr>
-            <a:lvl5pPr marL="1828800" indent="0">
+            <a:lvl5pPr marL="1828727" indent="0">
               <a:buNone/>
               <a:defRPr sz="1000"/>
             </a:lvl5pPr>
-            <a:lvl6pPr marL="2286000" indent="0">
+            <a:lvl6pPr marL="2285909" indent="0">
               <a:buNone/>
               <a:defRPr sz="1000"/>
             </a:lvl6pPr>
-            <a:lvl7pPr marL="2743200" indent="0">
+            <a:lvl7pPr marL="2743090" indent="0">
               <a:buNone/>
               <a:defRPr sz="1000"/>
             </a:lvl7pPr>
-            <a:lvl8pPr marL="3200400" indent="0">
+            <a:lvl8pPr marL="3200272" indent="0">
               <a:buNone/>
               <a:defRPr sz="1000"/>
             </a:lvl8pPr>
-            <a:lvl9pPr marL="3657600" indent="0">
+            <a:lvl9pPr marL="3657454" indent="0">
               <a:buNone/>
               <a:defRPr sz="1000"/>
             </a:lvl9pPr>
@@ -2353,7 +2353,7 @@
           <a:p>
             <a:fld id="{4E348793-E847-104E-A4BF-895FFE80E6AE}" type="datetimeFigureOut">
               <a:rPr lang="en-US" smtClean="0"/>
-              <a:t>1/7/25</a:t>
+              <a:t>1/18/25</a:t>
             </a:fld>
             <a:endParaRPr lang="en-US"/>
           </a:p>
@@ -2448,8 +2448,8 @@
         </p:nvSpPr>
         <p:spPr>
           <a:xfrm>
-            <a:off x="628650" y="365126"/>
-            <a:ext cx="7886700" cy="1325563"/>
+            <a:off x="628650" y="365128"/>
+            <a:ext cx="7886700" cy="1325564"/>
           </a:xfrm>
           <a:prstGeom prst="rect">
             <a:avLst/>
@@ -2481,7 +2481,7 @@
         </p:nvSpPr>
         <p:spPr>
           <a:xfrm>
-            <a:off x="628650" y="1825625"/>
+            <a:off x="628650" y="1825624"/>
             <a:ext cx="7886700" cy="4351338"/>
           </a:xfrm>
           <a:prstGeom prst="rect">
@@ -2543,8 +2543,8 @@
         </p:nvSpPr>
         <p:spPr>
           <a:xfrm>
-            <a:off x="628650" y="6356351"/>
-            <a:ext cx="2057400" cy="365125"/>
+            <a:off x="628650" y="6356353"/>
+            <a:ext cx="2057400" cy="365126"/>
           </a:xfrm>
           <a:prstGeom prst="rect">
             <a:avLst/>
@@ -2566,7 +2566,7 @@
           <a:p>
             <a:fld id="{4E348793-E847-104E-A4BF-895FFE80E6AE}" type="datetimeFigureOut">
               <a:rPr lang="en-US" smtClean="0"/>
-              <a:t>1/7/25</a:t>
+              <a:t>1/18/25</a:t>
             </a:fld>
             <a:endParaRPr lang="en-US"/>
           </a:p>
@@ -2584,8 +2584,8 @@
         </p:nvSpPr>
         <p:spPr>
           <a:xfrm>
-            <a:off x="3028950" y="6356351"/>
-            <a:ext cx="3086100" cy="365125"/>
+            <a:off x="3028950" y="6356353"/>
+            <a:ext cx="3086100" cy="365126"/>
           </a:xfrm>
           <a:prstGeom prst="rect">
             <a:avLst/>
@@ -2621,8 +2621,8 @@
         </p:nvSpPr>
         <p:spPr>
           <a:xfrm>
-            <a:off x="6457950" y="6356351"/>
-            <a:ext cx="2057400" cy="365125"/>
+            <a:off x="6457950" y="6356353"/>
+            <a:ext cx="2057400" cy="365126"/>
           </a:xfrm>
           <a:prstGeom prst="rect">
             <a:avLst/>
@@ -2673,7 +2673,7 @@
   </p:sldLayoutIdLst>
   <p:txStyles>
     <p:titleStyle>
-      <a:lvl1pPr algn="l" defTabSz="914400" rtl="0" eaLnBrk="1" latinLnBrk="0" hangingPunct="1">
+      <a:lvl1pPr algn="l" defTabSz="914363" rtl="0" eaLnBrk="1" latinLnBrk="0" hangingPunct="1">
         <a:lnSpc>
           <a:spcPct val="90000"/>
         </a:lnSpc>
@@ -2692,7 +2692,7 @@
       </a:lvl1pPr>
     </p:titleStyle>
     <p:bodyStyle>
-      <a:lvl1pPr marL="228600" indent="-228600" algn="l" defTabSz="914400" rtl="0" eaLnBrk="1" latinLnBrk="0" hangingPunct="1">
+      <a:lvl1pPr marL="228591" indent="-228591" algn="l" defTabSz="914363" rtl="0" eaLnBrk="1" latinLnBrk="0" hangingPunct="1">
         <a:lnSpc>
           <a:spcPct val="90000"/>
         </a:lnSpc>
@@ -2710,7 +2710,7 @@
           <a:cs typeface="+mn-cs"/>
         </a:defRPr>
       </a:lvl1pPr>
-      <a:lvl2pPr marL="685800" indent="-228600" algn="l" defTabSz="914400" rtl="0" eaLnBrk="1" latinLnBrk="0" hangingPunct="1">
+      <a:lvl2pPr marL="685773" indent="-228591" algn="l" defTabSz="914363" rtl="0" eaLnBrk="1" latinLnBrk="0" hangingPunct="1">
         <a:lnSpc>
           <a:spcPct val="90000"/>
         </a:lnSpc>
@@ -2728,7 +2728,7 @@
           <a:cs typeface="+mn-cs"/>
         </a:defRPr>
       </a:lvl2pPr>
-      <a:lvl3pPr marL="1143000" indent="-228600" algn="l" defTabSz="914400" rtl="0" eaLnBrk="1" latinLnBrk="0" hangingPunct="1">
+      <a:lvl3pPr marL="1142954" indent="-228591" algn="l" defTabSz="914363" rtl="0" eaLnBrk="1" latinLnBrk="0" hangingPunct="1">
         <a:lnSpc>
           <a:spcPct val="90000"/>
         </a:lnSpc>
@@ -2746,7 +2746,7 @@
           <a:cs typeface="+mn-cs"/>
         </a:defRPr>
       </a:lvl3pPr>
-      <a:lvl4pPr marL="1600200" indent="-228600" algn="l" defTabSz="914400" rtl="0" eaLnBrk="1" latinLnBrk="0" hangingPunct="1">
+      <a:lvl4pPr marL="1600136" indent="-228591" algn="l" defTabSz="914363" rtl="0" eaLnBrk="1" latinLnBrk="0" hangingPunct="1">
         <a:lnSpc>
           <a:spcPct val="90000"/>
         </a:lnSpc>
@@ -2764,7 +2764,7 @@
           <a:cs typeface="+mn-cs"/>
         </a:defRPr>
       </a:lvl4pPr>
-      <a:lvl5pPr marL="2057400" indent="-228600" algn="l" defTabSz="914400" rtl="0" eaLnBrk="1" latinLnBrk="0" hangingPunct="1">
+      <a:lvl5pPr marL="2057318" indent="-228591" algn="l" defTabSz="914363" rtl="0" eaLnBrk="1" latinLnBrk="0" hangingPunct="1">
         <a:lnSpc>
           <a:spcPct val="90000"/>
         </a:lnSpc>
@@ -2782,7 +2782,7 @@
           <a:cs typeface="+mn-cs"/>
         </a:defRPr>
       </a:lvl5pPr>
-      <a:lvl6pPr marL="2514600" indent="-228600" algn="l" defTabSz="914400" rtl="0" eaLnBrk="1" latinLnBrk="0" hangingPunct="1">
+      <a:lvl6pPr marL="2514499" indent="-228591" algn="l" defTabSz="914363" rtl="0" eaLnBrk="1" latinLnBrk="0" hangingPunct="1">
         <a:lnSpc>
           <a:spcPct val="90000"/>
         </a:lnSpc>
@@ -2800,7 +2800,7 @@
           <a:cs typeface="+mn-cs"/>
         </a:defRPr>
       </a:lvl6pPr>
-      <a:lvl7pPr marL="2971800" indent="-228600" algn="l" defTabSz="914400" rtl="0" eaLnBrk="1" latinLnBrk="0" hangingPunct="1">
+      <a:lvl7pPr marL="2971681" indent="-228591" algn="l" defTabSz="914363" rtl="0" eaLnBrk="1" latinLnBrk="0" hangingPunct="1">
         <a:lnSpc>
           <a:spcPct val="90000"/>
         </a:lnSpc>
@@ -2818,7 +2818,7 @@
           <a:cs typeface="+mn-cs"/>
         </a:defRPr>
       </a:lvl7pPr>
-      <a:lvl8pPr marL="3429000" indent="-228600" algn="l" defTabSz="914400" rtl="0" eaLnBrk="1" latinLnBrk="0" hangingPunct="1">
+      <a:lvl8pPr marL="3428863" indent="-228591" algn="l" defTabSz="914363" rtl="0" eaLnBrk="1" latinLnBrk="0" hangingPunct="1">
         <a:lnSpc>
           <a:spcPct val="90000"/>
         </a:lnSpc>
@@ -2836,7 +2836,7 @@
           <a:cs typeface="+mn-cs"/>
         </a:defRPr>
       </a:lvl8pPr>
-      <a:lvl9pPr marL="3886200" indent="-228600" algn="l" defTabSz="914400" rtl="0" eaLnBrk="1" latinLnBrk="0" hangingPunct="1">
+      <a:lvl9pPr marL="3886045" indent="-228591" algn="l" defTabSz="914363" rtl="0" eaLnBrk="1" latinLnBrk="0" hangingPunct="1">
         <a:lnSpc>
           <a:spcPct val="90000"/>
         </a:lnSpc>
@@ -2859,7 +2859,7 @@
       <a:defPPr>
         <a:defRPr lang="en-US"/>
       </a:defPPr>
-      <a:lvl1pPr marL="0" algn="l" defTabSz="914400" rtl="0" eaLnBrk="1" latinLnBrk="0" hangingPunct="1">
+      <a:lvl1pPr marL="0" algn="l" defTabSz="914363" rtl="0" eaLnBrk="1" latinLnBrk="0" hangingPunct="1">
         <a:defRPr sz="1800" kern="1200">
           <a:solidFill>
             <a:schemeClr val="tx1"/>
@@ -2869,7 +2869,7 @@
           <a:cs typeface="+mn-cs"/>
         </a:defRPr>
       </a:lvl1pPr>
-      <a:lvl2pPr marL="457200" algn="l" defTabSz="914400" rtl="0" eaLnBrk="1" latinLnBrk="0" hangingPunct="1">
+      <a:lvl2pPr marL="457182" algn="l" defTabSz="914363" rtl="0" eaLnBrk="1" latinLnBrk="0" hangingPunct="1">
         <a:defRPr sz="1800" kern="1200">
           <a:solidFill>
             <a:schemeClr val="tx1"/>
@@ -2879,7 +2879,7 @@
           <a:cs typeface="+mn-cs"/>
         </a:defRPr>
       </a:lvl2pPr>
-      <a:lvl3pPr marL="914400" algn="l" defTabSz="914400" rtl="0" eaLnBrk="1" latinLnBrk="0" hangingPunct="1">
+      <a:lvl3pPr marL="914363" algn="l" defTabSz="914363" rtl="0" eaLnBrk="1" latinLnBrk="0" hangingPunct="1">
         <a:defRPr sz="1800" kern="1200">
           <a:solidFill>
             <a:schemeClr val="tx1"/>
@@ -2889,7 +2889,7 @@
           <a:cs typeface="+mn-cs"/>
         </a:defRPr>
       </a:lvl3pPr>
-      <a:lvl4pPr marL="1371600" algn="l" defTabSz="914400" rtl="0" eaLnBrk="1" latinLnBrk="0" hangingPunct="1">
+      <a:lvl4pPr marL="1371545" algn="l" defTabSz="914363" rtl="0" eaLnBrk="1" latinLnBrk="0" hangingPunct="1">
         <a:defRPr sz="1800" kern="1200">
           <a:solidFill>
             <a:schemeClr val="tx1"/>
@@ -2899,7 +2899,7 @@
           <a:cs typeface="+mn-cs"/>
         </a:defRPr>
       </a:lvl4pPr>
-      <a:lvl5pPr marL="1828800" algn="l" defTabSz="914400" rtl="0" eaLnBrk="1" latinLnBrk="0" hangingPunct="1">
+      <a:lvl5pPr marL="1828727" algn="l" defTabSz="914363" rtl="0" eaLnBrk="1" latinLnBrk="0" hangingPunct="1">
         <a:defRPr sz="1800" kern="1200">
           <a:solidFill>
             <a:schemeClr val="tx1"/>
@@ -2909,7 +2909,7 @@
           <a:cs typeface="+mn-cs"/>
         </a:defRPr>
       </a:lvl5pPr>
-      <a:lvl6pPr marL="2286000" algn="l" defTabSz="914400" rtl="0" eaLnBrk="1" latinLnBrk="0" hangingPunct="1">
+      <a:lvl6pPr marL="2285909" algn="l" defTabSz="914363" rtl="0" eaLnBrk="1" latinLnBrk="0" hangingPunct="1">
         <a:defRPr sz="1800" kern="1200">
           <a:solidFill>
             <a:schemeClr val="tx1"/>
@@ -2919,7 +2919,7 @@
           <a:cs typeface="+mn-cs"/>
         </a:defRPr>
       </a:lvl6pPr>
-      <a:lvl7pPr marL="2743200" algn="l" defTabSz="914400" rtl="0" eaLnBrk="1" latinLnBrk="0" hangingPunct="1">
+      <a:lvl7pPr marL="2743090" algn="l" defTabSz="914363" rtl="0" eaLnBrk="1" latinLnBrk="0" hangingPunct="1">
         <a:defRPr sz="1800" kern="1200">
           <a:solidFill>
             <a:schemeClr val="tx1"/>
@@ -2929,7 +2929,7 @@
           <a:cs typeface="+mn-cs"/>
         </a:defRPr>
       </a:lvl7pPr>
-      <a:lvl8pPr marL="3200400" algn="l" defTabSz="914400" rtl="0" eaLnBrk="1" latinLnBrk="0" hangingPunct="1">
+      <a:lvl8pPr marL="3200272" algn="l" defTabSz="914363" rtl="0" eaLnBrk="1" latinLnBrk="0" hangingPunct="1">
         <a:defRPr sz="1800" kern="1200">
           <a:solidFill>
             <a:schemeClr val="tx1"/>
@@ -2939,7 +2939,7 @@
           <a:cs typeface="+mn-cs"/>
         </a:defRPr>
       </a:lvl8pPr>
-      <a:lvl9pPr marL="3657600" algn="l" defTabSz="914400" rtl="0" eaLnBrk="1" latinLnBrk="0" hangingPunct="1">
+      <a:lvl9pPr marL="3657454" algn="l" defTabSz="914363" rtl="0" eaLnBrk="1" latinLnBrk="0" hangingPunct="1">
         <a:defRPr sz="1800" kern="1200">
           <a:solidFill>
             <a:schemeClr val="tx1"/>
@@ -2971,35 +2971,6 @@
           <a:chExt cx="0" cy="0"/>
         </a:xfrm>
       </p:grpSpPr>
-      <p:pic>
-        <p:nvPicPr>
-          <p:cNvPr id="6" name="Picture 5">
-            <a:extLst>
-              <a:ext uri="{FF2B5EF4-FFF2-40B4-BE49-F238E27FC236}">
-                <a16:creationId xmlns:a16="http://schemas.microsoft.com/office/drawing/2014/main" id="{3A31484E-51A5-854D-8311-DA9365FC746E}"/>
-              </a:ext>
-            </a:extLst>
-          </p:cNvPr>
-          <p:cNvPicPr>
-            <a:picLocks noChangeAspect="1"/>
-          </p:cNvPicPr>
-          <p:nvPr/>
-        </p:nvPicPr>
-        <p:blipFill rotWithShape="1">
-          <a:blip r:embed="rId2"/>
-          <a:srcRect l="65817" t="35087" r="24138" b="34789"/>
-          <a:stretch/>
-        </p:blipFill>
-        <p:spPr>
-          <a:xfrm>
-            <a:off x="4707649" y="584775"/>
-            <a:ext cx="1296000" cy="2743200"/>
-          </a:xfrm>
-          <a:prstGeom prst="rect">
-            <a:avLst/>
-          </a:prstGeom>
-        </p:spPr>
-      </p:pic>
       <p:grpSp>
         <p:nvGrpSpPr>
           <p:cNvPr id="12" name="Group 11">
@@ -3016,8 +2987,8 @@
         </p:nvGrpSpPr>
         <p:grpSpPr>
           <a:xfrm>
-            <a:off x="71300" y="3823900"/>
-            <a:ext cx="1360208" cy="2743200"/>
+            <a:off x="232073" y="1988916"/>
+            <a:ext cx="999262" cy="2015262"/>
             <a:chOff x="522514" y="1056555"/>
             <a:chExt cx="430306" cy="867820"/>
           </a:xfrm>
@@ -3037,7 +3008,7 @@
             <p:nvPr/>
           </p:nvPicPr>
           <p:blipFill rotWithShape="1">
-            <a:blip r:embed="rId3"/>
+            <a:blip r:embed="rId2"/>
             <a:srcRect l="66728" t="35211" r="22714" b="34622"/>
             <a:stretch/>
           </p:blipFill>
@@ -3066,7 +3037,7 @@
             <p:nvPr/>
           </p:nvPicPr>
           <p:blipFill rotWithShape="1">
-            <a:blip r:embed="rId3"/>
+            <a:blip r:embed="rId2"/>
             <a:srcRect l="89209" t="78403" r="3792" b="1596"/>
             <a:stretch/>
           </p:blipFill>
@@ -3095,8 +3066,8 @@
         </p:nvSpPr>
         <p:spPr>
           <a:xfrm>
-            <a:off x="51995" y="0"/>
-            <a:ext cx="1886851" cy="1077218"/>
+            <a:off x="0" y="1313751"/>
+            <a:ext cx="1886851" cy="646331"/>
           </a:xfrm>
           <a:prstGeom prst="rect">
             <a:avLst/>
@@ -3110,10 +3081,10 @@
           <a:lstStyle/>
           <a:p>
             <a:r>
-              <a:rPr lang="en-US" sz="1600" dirty="0">
+              <a:rPr lang="en-US" sz="1200" dirty="0">
                 <a:latin typeface="Helvetica" pitchFamily="2" charset="0"/>
               </a:rPr>
-              <a:t>Survey data of multiple trophic levels of the pelagic NCC:</a:t>
+              <a:t>Survey data of multiple trophic levels of the pelagic NCC</a:t>
             </a:r>
           </a:p>
         </p:txBody>
@@ -3132,8 +3103,8 @@
         </p:nvSpPr>
         <p:spPr>
           <a:xfrm>
-            <a:off x="4181192" y="0"/>
-            <a:ext cx="2348914" cy="584775"/>
+            <a:off x="4030150" y="1313751"/>
+            <a:ext cx="2348914" cy="461665"/>
           </a:xfrm>
           <a:prstGeom prst="rect">
             <a:avLst/>
@@ -3147,43 +3118,151 @@
           <a:lstStyle/>
           <a:p>
             <a:r>
-              <a:rPr lang="en-US" sz="1600" dirty="0">
+              <a:rPr lang="en-US" sz="1200" dirty="0">
                 <a:latin typeface="Helvetica" pitchFamily="2" charset="0"/>
               </a:rPr>
-              <a:t>Modeled distributions for each taxon</a:t>
-            </a:r>
-          </a:p>
-        </p:txBody>
-      </p:sp>
-      <p:pic>
-        <p:nvPicPr>
-          <p:cNvPr id="15" name="Picture 14">
+              <a:t>Estimate spatiotemporal overlap between different taxa</a:t>
+            </a:r>
+          </a:p>
+        </p:txBody>
+      </p:sp>
+      <p:grpSp>
+        <p:nvGrpSpPr>
+          <p:cNvPr id="2" name="Group 1">
             <a:extLst>
               <a:ext uri="{FF2B5EF4-FFF2-40B4-BE49-F238E27FC236}">
-                <a16:creationId xmlns:a16="http://schemas.microsoft.com/office/drawing/2014/main" id="{074CCE55-BF44-9F44-95F5-1A3D9424B787}"/>
+                <a16:creationId xmlns:a16="http://schemas.microsoft.com/office/drawing/2014/main" id="{686BA8ED-48EE-D244-99DD-AAEF340B011E}"/>
               </a:ext>
             </a:extLst>
           </p:cNvPr>
-          <p:cNvPicPr>
-            <a:picLocks noChangeAspect="1"/>
-          </p:cNvPicPr>
+          <p:cNvGrpSpPr/>
           <p:nvPr/>
-        </p:nvPicPr>
-        <p:blipFill rotWithShape="1">
-          <a:blip r:embed="rId4"/>
-          <a:srcRect l="55872" t="67613" r="34199" b="2139"/>
-          <a:stretch/>
-        </p:blipFill>
-        <p:spPr>
+        </p:nvGrpSpPr>
+        <p:grpSpPr>
           <a:xfrm>
-            <a:off x="4728019" y="3395759"/>
-            <a:ext cx="1275630" cy="2743200"/>
+            <a:off x="4173703" y="1905203"/>
+            <a:ext cx="1978513" cy="2041199"/>
+            <a:chOff x="3848560" y="1895615"/>
+            <a:chExt cx="1978513" cy="2041199"/>
           </a:xfrm>
-          <a:prstGeom prst="rect">
-            <a:avLst/>
-          </a:prstGeom>
-        </p:spPr>
-      </p:pic>
+        </p:grpSpPr>
+        <p:sp>
+          <p:nvSpPr>
+            <p:cNvPr id="24" name="Rounded Rectangle 23">
+              <a:extLst>
+                <a:ext uri="{FF2B5EF4-FFF2-40B4-BE49-F238E27FC236}">
+                  <a16:creationId xmlns:a16="http://schemas.microsoft.com/office/drawing/2014/main" id="{A9FA3051-FADA-A948-A8A4-A5E6A3190F3E}"/>
+                </a:ext>
+              </a:extLst>
+            </p:cNvPr>
+            <p:cNvSpPr/>
+            <p:nvPr/>
+          </p:nvSpPr>
+          <p:spPr>
+            <a:xfrm>
+              <a:off x="3848560" y="1895615"/>
+              <a:ext cx="1978513" cy="2041199"/>
+            </a:xfrm>
+            <a:prstGeom prst="roundRect">
+              <a:avLst/>
+            </a:prstGeom>
+            <a:solidFill>
+              <a:schemeClr val="accent6">
+                <a:alpha val="49000"/>
+              </a:schemeClr>
+            </a:solidFill>
+            <a:ln>
+              <a:solidFill>
+                <a:schemeClr val="accent6">
+                  <a:lumMod val="50000"/>
+                </a:schemeClr>
+              </a:solidFill>
+            </a:ln>
+          </p:spPr>
+          <p:style>
+            <a:lnRef idx="2">
+              <a:schemeClr val="accent1">
+                <a:shade val="50000"/>
+              </a:schemeClr>
+            </a:lnRef>
+            <a:fillRef idx="1">
+              <a:schemeClr val="accent1"/>
+            </a:fillRef>
+            <a:effectRef idx="0">
+              <a:schemeClr val="accent1"/>
+            </a:effectRef>
+            <a:fontRef idx="minor">
+              <a:schemeClr val="lt1"/>
+            </a:fontRef>
+          </p:style>
+          <p:txBody>
+            <a:bodyPr rtlCol="0" anchor="ctr"/>
+            <a:lstStyle/>
+            <a:p>
+              <a:pPr algn="ctr"/>
+              <a:endParaRPr lang="en-US"/>
+            </a:p>
+          </p:txBody>
+        </p:sp>
+        <p:pic>
+          <p:nvPicPr>
+            <p:cNvPr id="6" name="Picture 5">
+              <a:extLst>
+                <a:ext uri="{FF2B5EF4-FFF2-40B4-BE49-F238E27FC236}">
+                  <a16:creationId xmlns:a16="http://schemas.microsoft.com/office/drawing/2014/main" id="{3A31484E-51A5-854D-8311-DA9365FC746E}"/>
+                </a:ext>
+              </a:extLst>
+            </p:cNvPr>
+            <p:cNvPicPr>
+              <a:picLocks noChangeAspect="1"/>
+            </p:cNvPicPr>
+            <p:nvPr/>
+          </p:nvPicPr>
+          <p:blipFill rotWithShape="1">
+            <a:blip r:embed="rId3"/>
+            <a:srcRect l="65817" t="35087" r="24138" b="34789"/>
+            <a:stretch/>
+          </p:blipFill>
+          <p:spPr>
+            <a:xfrm>
+              <a:off x="3941728" y="2018345"/>
+              <a:ext cx="864000" cy="1828800"/>
+            </a:xfrm>
+            <a:prstGeom prst="rect">
+              <a:avLst/>
+            </a:prstGeom>
+          </p:spPr>
+        </p:pic>
+        <p:pic>
+          <p:nvPicPr>
+            <p:cNvPr id="15" name="Picture 14">
+              <a:extLst>
+                <a:ext uri="{FF2B5EF4-FFF2-40B4-BE49-F238E27FC236}">
+                  <a16:creationId xmlns:a16="http://schemas.microsoft.com/office/drawing/2014/main" id="{074CCE55-BF44-9F44-95F5-1A3D9424B787}"/>
+                </a:ext>
+              </a:extLst>
+            </p:cNvPr>
+            <p:cNvPicPr>
+              <a:picLocks noChangeAspect="1"/>
+            </p:cNvPicPr>
+            <p:nvPr/>
+          </p:nvPicPr>
+          <p:blipFill rotWithShape="1">
+            <a:blip r:embed="rId4"/>
+            <a:srcRect l="55872" t="67613" r="34199" b="2139"/>
+            <a:stretch/>
+          </p:blipFill>
+          <p:spPr>
+            <a:xfrm>
+              <a:off x="4879464" y="2018345"/>
+              <a:ext cx="850420" cy="1828800"/>
+            </a:xfrm>
+            <a:prstGeom prst="rect">
+              <a:avLst/>
+            </a:prstGeom>
+          </p:spPr>
+        </p:pic>
+      </p:grpSp>
       <p:sp>
         <p:nvSpPr>
           <p:cNvPr id="16" name="Right Arrow 15">
@@ -3198,7 +3277,7 @@
         </p:nvSpPr>
         <p:spPr>
           <a:xfrm>
-            <a:off x="4021582" y="3180265"/>
+            <a:off x="3398899" y="2701127"/>
             <a:ext cx="643153" cy="295419"/>
           </a:xfrm>
           <a:prstGeom prst="rightArrow">
@@ -3265,131 +3344,14 @@
         </p:blipFill>
         <p:spPr>
           <a:xfrm>
-            <a:off x="2373069" y="2413574"/>
-            <a:ext cx="1591161" cy="1828800"/>
+            <a:off x="2035118" y="2169184"/>
+            <a:ext cx="1250607" cy="1437384"/>
           </a:xfrm>
           <a:prstGeom prst="rect">
             <a:avLst/>
           </a:prstGeom>
         </p:spPr>
       </p:pic>
-      <p:sp>
-        <p:nvSpPr>
-          <p:cNvPr id="20" name="TextBox 19">
-            <a:extLst>
-              <a:ext uri="{FF2B5EF4-FFF2-40B4-BE49-F238E27FC236}">
-                <a16:creationId xmlns:a16="http://schemas.microsoft.com/office/drawing/2014/main" id="{C768AA60-1EF5-864E-A1B2-92FF2C088A99}"/>
-              </a:ext>
-            </a:extLst>
-          </p:cNvPr>
-          <p:cNvSpPr txBox="1"/>
-          <p:nvPr/>
-        </p:nvSpPr>
-        <p:spPr>
-          <a:xfrm>
-            <a:off x="51995" y="969595"/>
-            <a:ext cx="1771572" cy="3046988"/>
-          </a:xfrm>
-          <a:prstGeom prst="rect">
-            <a:avLst/>
-          </a:prstGeom>
-          <a:noFill/>
-        </p:spPr>
-        <p:txBody>
-          <a:bodyPr wrap="square" rtlCol="0">
-            <a:spAutoFit/>
-          </a:bodyPr>
-          <a:lstStyle/>
-          <a:p>
-            <a:endParaRPr lang="en-US" sz="1200" dirty="0">
-              <a:latin typeface="Helvetica" pitchFamily="2" charset="0"/>
-            </a:endParaRPr>
-          </a:p>
-          <a:p>
-            <a:r>
-              <a:rPr lang="en-US" sz="1200" dirty="0">
-                <a:latin typeface="Helvetica" pitchFamily="2" charset="0"/>
-              </a:rPr>
-              <a:t>Forage fishes (CCES/CPS survey)</a:t>
-            </a:r>
-          </a:p>
-          <a:p>
-            <a:endParaRPr lang="en-US" sz="1200" dirty="0">
-              <a:latin typeface="Helvetica" pitchFamily="2" charset="0"/>
-            </a:endParaRPr>
-          </a:p>
-          <a:p>
-            <a:r>
-              <a:rPr lang="en-US" sz="1200" dirty="0">
-                <a:latin typeface="Helvetica" pitchFamily="2" charset="0"/>
-              </a:rPr>
-              <a:t>Juvenile salmon (JSOES trawl)</a:t>
-            </a:r>
-          </a:p>
-          <a:p>
-            <a:endParaRPr lang="en-US" sz="1200" dirty="0">
-              <a:latin typeface="Helvetica" pitchFamily="2" charset="0"/>
-            </a:endParaRPr>
-          </a:p>
-          <a:p>
-            <a:r>
-              <a:rPr lang="en-US" sz="1200" dirty="0" err="1">
-                <a:latin typeface="Helvetica" pitchFamily="2" charset="0"/>
-              </a:rPr>
-              <a:t>Macrozooplankton</a:t>
-            </a:r>
-            <a:r>
-              <a:rPr lang="en-US" sz="1200" dirty="0">
-                <a:latin typeface="Helvetica" pitchFamily="2" charset="0"/>
-              </a:rPr>
-              <a:t> and micronekton (PRS)</a:t>
-            </a:r>
-          </a:p>
-          <a:p>
-            <a:endParaRPr lang="en-US" sz="1200" dirty="0">
-              <a:latin typeface="Helvetica" pitchFamily="2" charset="0"/>
-            </a:endParaRPr>
-          </a:p>
-          <a:p>
-            <a:r>
-              <a:rPr lang="en-US" sz="1200" dirty="0">
-                <a:latin typeface="Helvetica" pitchFamily="2" charset="0"/>
-              </a:rPr>
-              <a:t>Small zooplankton (JSOES Bongo)</a:t>
-            </a:r>
-          </a:p>
-          <a:p>
-            <a:endParaRPr lang="en-US" sz="1200" dirty="0">
-              <a:latin typeface="Helvetica" pitchFamily="2" charset="0"/>
-            </a:endParaRPr>
-          </a:p>
-          <a:p>
-            <a:r>
-              <a:rPr lang="en-US" sz="1200" dirty="0">
-                <a:latin typeface="Helvetica" pitchFamily="2" charset="0"/>
-              </a:rPr>
-              <a:t>Phytoplankton (</a:t>
-            </a:r>
-            <a:r>
-              <a:rPr lang="en-US" sz="1200" dirty="0" err="1">
-                <a:latin typeface="Helvetica" pitchFamily="2" charset="0"/>
-              </a:rPr>
-              <a:t>chl</a:t>
-            </a:r>
-            <a:r>
-              <a:rPr lang="en-US" sz="1200" dirty="0">
-                <a:latin typeface="Helvetica" pitchFamily="2" charset="0"/>
-              </a:rPr>
-              <a:t>-a from remote sensing)</a:t>
-            </a:r>
-          </a:p>
-          <a:p>
-            <a:endParaRPr lang="en-US" sz="1200" dirty="0">
-              <a:latin typeface="Helvetica" pitchFamily="2" charset="0"/>
-            </a:endParaRPr>
-          </a:p>
-        </p:txBody>
-      </p:sp>
       <p:sp>
         <p:nvSpPr>
           <p:cNvPr id="21" name="Right Arrow 20">
@@ -3404,7 +3366,7 @@
         </p:nvSpPr>
         <p:spPr>
           <a:xfrm>
-            <a:off x="1687002" y="3248049"/>
+            <a:off x="1251704" y="2701127"/>
             <a:ext cx="643153" cy="295419"/>
           </a:xfrm>
           <a:prstGeom prst="rightArrow">
@@ -3463,7 +3425,7 @@
         </p:nvSpPr>
         <p:spPr>
           <a:xfrm>
-            <a:off x="6103915" y="3180264"/>
+            <a:off x="6249260" y="2701127"/>
             <a:ext cx="643153" cy="295419"/>
           </a:xfrm>
           <a:prstGeom prst="rightArrow">
@@ -3522,8 +3484,8 @@
         </p:nvSpPr>
         <p:spPr>
           <a:xfrm>
-            <a:off x="6767438" y="3035585"/>
-            <a:ext cx="2348914" cy="3046988"/>
+            <a:off x="6818521" y="1313751"/>
+            <a:ext cx="2348914" cy="830997"/>
           </a:xfrm>
           <a:prstGeom prst="rect">
             <a:avLst/>
@@ -3537,14 +3499,81 @@
           <a:lstStyle/>
           <a:p>
             <a:r>
-              <a:rPr lang="en-US" sz="1600" dirty="0">
+              <a:rPr lang="en-US" sz="1200" dirty="0">
                 <a:latin typeface="Helvetica" pitchFamily="2" charset="0"/>
               </a:rPr>
-              <a:t>Calculate metrics of overlap; use to discuss foraging opportunity, predation risk, and competition risk, and see if any of those predict SAR or adult returns in a model that also includes various other potential predictors of marine survival</a:t>
-            </a:r>
-          </a:p>
-        </p:txBody>
-      </p:sp>
+              <a:t>Fit model to predict adult returns, using spatiotemporal overlap indices as predictor variables</a:t>
+            </a:r>
+          </a:p>
+        </p:txBody>
+      </p:sp>
+      <p:sp>
+        <p:nvSpPr>
+          <p:cNvPr id="17" name="TextBox 16">
+            <a:extLst>
+              <a:ext uri="{FF2B5EF4-FFF2-40B4-BE49-F238E27FC236}">
+                <a16:creationId xmlns:a16="http://schemas.microsoft.com/office/drawing/2014/main" id="{16DFDBE4-04FE-6345-88D7-22433154BEFA}"/>
+              </a:ext>
+            </a:extLst>
+          </p:cNvPr>
+          <p:cNvSpPr txBox="1"/>
+          <p:nvPr/>
+        </p:nvSpPr>
+        <p:spPr>
+          <a:xfrm>
+            <a:off x="1792944" y="1313751"/>
+            <a:ext cx="1978514" cy="830997"/>
+          </a:xfrm>
+          <a:prstGeom prst="rect">
+            <a:avLst/>
+          </a:prstGeom>
+          <a:noFill/>
+        </p:spPr>
+        <p:txBody>
+          <a:bodyPr wrap="square" rtlCol="0">
+            <a:spAutoFit/>
+          </a:bodyPr>
+          <a:lstStyle/>
+          <a:p>
+            <a:r>
+              <a:rPr lang="en-US" sz="1200" dirty="0">
+                <a:latin typeface="Helvetica" pitchFamily="2" charset="0"/>
+              </a:rPr>
+              <a:t>Fit spatiotemporal models, using environmental covariates, to estimate the distribution of each taxon</a:t>
+            </a:r>
+          </a:p>
+        </p:txBody>
+      </p:sp>
+      <p:pic>
+        <p:nvPicPr>
+          <p:cNvPr id="4" name="Picture 3">
+            <a:extLst>
+              <a:ext uri="{FF2B5EF4-FFF2-40B4-BE49-F238E27FC236}">
+                <a16:creationId xmlns:a16="http://schemas.microsoft.com/office/drawing/2014/main" id="{59975502-82D3-034A-A54C-5A48BA2C1DD1}"/>
+              </a:ext>
+            </a:extLst>
+          </p:cNvPr>
+          <p:cNvPicPr>
+            <a:picLocks noChangeAspect="1"/>
+          </p:cNvPicPr>
+          <p:nvPr/>
+        </p:nvPicPr>
+        <p:blipFill>
+          <a:blip r:embed="rId6"/>
+          <a:stretch>
+            <a:fillRect/>
+          </a:stretch>
+        </p:blipFill>
+        <p:spPr>
+          <a:xfrm>
+            <a:off x="6984921" y="2303469"/>
+            <a:ext cx="1600458" cy="1242709"/>
+          </a:xfrm>
+          <a:prstGeom prst="rect">
+            <a:avLst/>
+          </a:prstGeom>
+        </p:spPr>
+      </p:pic>
     </p:spTree>
     <p:extLst>
       <p:ext uri="{BB962C8B-B14F-4D97-AF65-F5344CB8AC3E}">

</xml_diff>